<commit_message>
okay call it linear
</commit_message>
<xml_diff>
--- a/18-clustering/slides.pptx
+++ b/18-clustering/slides.pptx
@@ -18754,21 +18754,7 @@
                 <a:latin typeface="PFDinTextCompPro-Italic"/>
                 <a:cs typeface="PFDinTextCompPro-Italic"/>
               </a:rPr>
-              <a:t>The real purpose of clustering </a:t>
-            </a:r>
-            <a:r>
-              <a:rPr lang="en-US" sz="3000" dirty="0" smtClean="0">
-                <a:latin typeface="PFDinTextCompPro-Italic"/>
-                <a:cs typeface="PFDinTextCompPro-Italic"/>
-              </a:rPr>
-              <a:t>can be data </a:t>
-            </a:r>
-            <a:r>
-              <a:rPr lang="en-US" sz="3000" dirty="0" smtClean="0">
-                <a:latin typeface="PFDinTextCompPro-Italic"/>
-                <a:cs typeface="PFDinTextCompPro-Italic"/>
-              </a:rPr>
-              <a:t>exploration, so a solution is anything that contributes to your understanding.</a:t>
+              <a:t>The real purpose of clustering can be data exploration, so a solution is anything that contributes to your understanding.</a:t>
             </a:r>
           </a:p>
         </p:txBody>
@@ -19376,14 +19362,6 @@
               </a:rPr>
               <a:t>exercise:</a:t>
             </a:r>
-            <a:r>
-              <a:rPr lang="en-US" sz="3000" dirty="0" smtClean="0">
-                <a:latin typeface="PFDinTextCompPro-Bold" charset="0"/>
-                <a:ea typeface="ヒラギノ角ゴ ProN W6" charset="0"/>
-                <a:cs typeface="ヒラギノ角ゴ ProN W6" charset="0"/>
-              </a:rPr>
-              <a:t/>
-            </a:r>
             <a:br>
               <a:rPr lang="en-US" sz="3000" dirty="0" smtClean="0">
                 <a:latin typeface="PFDinTextCompPro-Bold" charset="0"/>
@@ -19397,15 +19375,7 @@
                 <a:ea typeface="ヒラギノ角ゴ ProN W6" charset="0"/>
                 <a:cs typeface="ヒラギノ角ゴ ProN W6" charset="0"/>
               </a:rPr>
-              <a:t>IV. </a:t>
-            </a:r>
-            <a:r>
-              <a:rPr lang="en-US" sz="3000" dirty="0" smtClean="0">
-                <a:latin typeface="PFDinTextCompPro-Bold" charset="0"/>
-                <a:ea typeface="ヒラギノ角ゴ ProN W6" charset="0"/>
-                <a:cs typeface="ヒラギノ角ゴ ProN W6" charset="0"/>
-              </a:rPr>
-              <a:t>K-means clustering</a:t>
+              <a:t>IV. K-means clustering</a:t>
             </a:r>
             <a:endParaRPr lang="en-US" sz="3000" cap="none" dirty="0">
               <a:latin typeface="PFDinTextCompPro-Bold" charset="0"/>
@@ -22774,7 +22744,7 @@
         <p:spPr>
           <a:xfrm>
             <a:off x="566737" y="1104900"/>
-            <a:ext cx="8382000" cy="553998"/>
+            <a:ext cx="8382000" cy="1015663"/>
           </a:xfrm>
           <a:prstGeom prst="rect">
             <a:avLst/>
@@ -22800,7 +22770,7 @@
                 <a:latin typeface="PFDinTextCompPro-Italic"/>
                 <a:cs typeface="PFDinTextCompPro-Italic"/>
               </a:rPr>
-              <a:t>elegant.</a:t>
+              <a:t>elegant, and has performance linear in the number of data points in practice.</a:t>
             </a:r>
             <a:endParaRPr lang="en-US" sz="3000" dirty="0" smtClean="0">
               <a:latin typeface="PFDinTextCompPro-Italic"/>
@@ -22919,7 +22889,7 @@
         <p:spPr>
           <a:xfrm>
             <a:off x="566737" y="1104900"/>
-            <a:ext cx="8382000" cy="1938992"/>
+            <a:ext cx="8382000" cy="2400657"/>
           </a:xfrm>
           <a:prstGeom prst="rect">
             <a:avLst/>
@@ -22941,11 +22911,11 @@
               <a:t>K-means is algorithmically pretty </a:t>
             </a:r>
             <a:r>
-              <a:rPr lang="en-US" sz="3000" dirty="0" smtClean="0">
+              <a:rPr lang="en-US" sz="3000" dirty="0">
                 <a:latin typeface="PFDinTextCompPro-Italic"/>
                 <a:cs typeface="PFDinTextCompPro-Italic"/>
               </a:rPr>
-              <a:t>elegant.</a:t>
+              <a:t>elegant, and has performance linear in the number of data points in practice.</a:t>
             </a:r>
             <a:endParaRPr lang="en-US" sz="3000" dirty="0" smtClean="0">
               <a:latin typeface="PFDinTextCompPro-Italic"/>
@@ -23095,7 +23065,7 @@
         <p:spPr>
           <a:xfrm>
             <a:off x="566737" y="1104900"/>
-            <a:ext cx="8382000" cy="3323987"/>
+            <a:ext cx="8382000" cy="3785652"/>
           </a:xfrm>
           <a:prstGeom prst="rect">
             <a:avLst/>
@@ -23117,11 +23087,11 @@
               <a:t>K-means is algorithmically pretty </a:t>
             </a:r>
             <a:r>
-              <a:rPr lang="en-US" sz="3000" dirty="0" smtClean="0">
+              <a:rPr lang="en-US" sz="3000" dirty="0">
                 <a:latin typeface="PFDinTextCompPro-Italic"/>
                 <a:cs typeface="PFDinTextCompPro-Italic"/>
               </a:rPr>
-              <a:t>elegant.</a:t>
+              <a:t>elegant, and has performance linear in the number of data points in practice.</a:t>
             </a:r>
             <a:endParaRPr lang="en-US" sz="3000" dirty="0" smtClean="0">
               <a:latin typeface="PFDinTextCompPro-Italic"/>
@@ -28161,19 +28131,8 @@
                 <a:latin typeface="PFDinTextCompPro-Italic"/>
                 <a:cs typeface="PFDinTextCompPro-Italic"/>
               </a:rPr>
-              <a:t> we know about the </a:t>
-            </a:r>
-            <a:r>
-              <a:rPr lang="en-US" sz="3000" dirty="0" smtClean="0">
-                <a:latin typeface="PFDinTextCompPro-Italic"/>
-                <a:cs typeface="PFDinTextCompPro-Italic"/>
-              </a:rPr>
-              <a:t>dataset as far as clustering is concerned.</a:t>
-            </a:r>
-            <a:endParaRPr lang="en-US" sz="3000" dirty="0" smtClean="0">
-              <a:latin typeface="PFDinTextCompPro-Italic"/>
-              <a:cs typeface="PFDinTextCompPro-Italic"/>
-            </a:endParaRPr>
+              <a:t> we know about the dataset as far as clustering is concerned.</a:t>
+            </a:r>
           </a:p>
         </p:txBody>
       </p:sp>
@@ -28426,19 +28385,8 @@
                 <a:latin typeface="PFDinTextCompPro-Italic"/>
                 <a:cs typeface="PFDinTextCompPro-Italic"/>
               </a:rPr>
-              <a:t> we know about the </a:t>
-            </a:r>
-            <a:r>
-              <a:rPr lang="en-US" sz="3000" dirty="0" smtClean="0">
-                <a:latin typeface="PFDinTextCompPro-Italic"/>
-                <a:cs typeface="PFDinTextCompPro-Italic"/>
-              </a:rPr>
-              <a:t>dataset as far as clustering is concerned.</a:t>
-            </a:r>
-            <a:endParaRPr lang="en-US" sz="3000" dirty="0" smtClean="0">
-              <a:latin typeface="PFDinTextCompPro-Italic"/>
-              <a:cs typeface="PFDinTextCompPro-Italic"/>
-            </a:endParaRPr>
+              <a:t> we know about the dataset as far as clustering is concerned.</a:t>
+            </a:r>
           </a:p>
           <a:p>
             <a:pPr algn="l"/>
@@ -35390,21 +35338,7 @@
                 <a:latin typeface="PFDinTextCompPro-Italic"/>
                 <a:cs typeface="PFDinTextCompPro-Italic"/>
               </a:rPr>
-              <a:t>A:  Statistically; </a:t>
-            </a:r>
-            <a:r>
-              <a:rPr lang="en-US" sz="3000" dirty="0" smtClean="0">
-                <a:latin typeface="PFDinTextCompPro-Italic"/>
-                <a:cs typeface="PFDinTextCompPro-Italic"/>
-              </a:rPr>
-              <a:t>e.g., </a:t>
-            </a:r>
-            <a:r>
-              <a:rPr lang="en-US" sz="3000" dirty="0" smtClean="0">
-                <a:latin typeface="PFDinTextCompPro-Italic"/>
-                <a:cs typeface="PFDinTextCompPro-Italic"/>
-              </a:rPr>
-              <a:t>by computing frequency distributions for these metrics (over several runs of the algorithm) and determining statistical significance.</a:t>
+              <a:t>A:  Statistically; e.g., by computing frequency distributions for these metrics (over several runs of the algorithm) and determining statistical significance.</a:t>
             </a:r>
           </a:p>
         </p:txBody>

</xml_diff>